<commit_message>
:white_check_mark: Finish index example
</commit_message>
<xml_diff>
--- a/20/yongki/DatabaseNeeds&Index.pptx
+++ b/20/yongki/DatabaseNeeds&Index.pptx
@@ -4930,7 +4930,7 @@
                   <a:schemeClr val="tx1"/>
                 </a:solidFill>
               </a:rPr>
-              <a:t>인덱스 안티 패턴</a:t>
+              <a:t>인덱스 사례</a:t>
             </a:r>
             <a:endParaRPr lang="es-ES" altLang="ko-KR" sz="3200" b="1">
               <a:solidFill>
@@ -5005,15 +5005,7 @@
                   <a:schemeClr val="tx1"/>
                 </a:solidFill>
               </a:rPr>
-              <a:t>엑셀로는 왜 충분하지 않지</a:t>
-            </a:r>
-            <a:r>
-              <a:rPr lang="en-US" altLang="ko-KR" sz="3200">
-                <a:solidFill>
-                  <a:schemeClr val="tx1"/>
-                </a:solidFill>
-              </a:rPr>
-              <a:t>?</a:t>
+              <a:t>인덱스 사례</a:t>
             </a:r>
             <a:endParaRPr lang="ko-KR" altLang="ko-KR" sz="2000">
               <a:solidFill>
@@ -5086,7 +5078,7 @@
         <p:spPr bwMode="auto">
           <a:xfrm>
             <a:off x="565684" y="1435903"/>
-            <a:ext cx="4654388" cy="307777"/>
+            <a:ext cx="7992888" cy="1169551"/>
           </a:xfrm>
           <a:prstGeom prst="rect">
             <a:avLst/>
@@ -5274,7 +5266,75 @@
                 <a:latin typeface="맑은 고딕" panose="020B0503020000020004" pitchFamily="50" charset="-127"/>
                 <a:ea typeface="맑은 고딕" panose="020B0503020000020004" pitchFamily="50" charset="-127"/>
               </a:rPr>
-              <a:t>생활코딩에서 스크랩한 토론글을 인용했다</a:t>
+              <a:t>전화번호부에 대한 테이블에 빠른 탐색을 하고 싶은 상황</a:t>
+            </a:r>
+            <a:br>
+              <a:rPr lang="en-US" altLang="ko-KR" sz="1400">
+                <a:solidFill>
+                  <a:srgbClr val="000000"/>
+                </a:solidFill>
+                <a:latin typeface="맑은 고딕" panose="020B0503020000020004" pitchFamily="50" charset="-127"/>
+                <a:ea typeface="맑은 고딕" panose="020B0503020000020004" pitchFamily="50" charset="-127"/>
+              </a:rPr>
+            </a:br>
+            <a:br>
+              <a:rPr lang="en-US" altLang="ko-KR" sz="1400">
+                <a:solidFill>
+                  <a:srgbClr val="000000"/>
+                </a:solidFill>
+                <a:latin typeface="맑은 고딕" panose="020B0503020000020004" pitchFamily="50" charset="-127"/>
+                <a:ea typeface="맑은 고딕" panose="020B0503020000020004" pitchFamily="50" charset="-127"/>
+              </a:rPr>
+            </a:br>
+            <a:r>
+              <a:rPr lang="ko-KR" altLang="en-US" sz="1400">
+                <a:solidFill>
+                  <a:srgbClr val="000000"/>
+                </a:solidFill>
+                <a:latin typeface="맑은 고딕" panose="020B0503020000020004" pitchFamily="50" charset="-127"/>
+                <a:ea typeface="맑은 고딕" panose="020B0503020000020004" pitchFamily="50" charset="-127"/>
+              </a:rPr>
+              <a:t>전화번호부의 정렬은 성</a:t>
+            </a:r>
+            <a:r>
+              <a:rPr lang="en-US" altLang="ko-KR" sz="1400">
+                <a:solidFill>
+                  <a:srgbClr val="000000"/>
+                </a:solidFill>
+                <a:latin typeface="맑은 고딕" panose="020B0503020000020004" pitchFamily="50" charset="-127"/>
+                <a:ea typeface="맑은 고딕" panose="020B0503020000020004" pitchFamily="50" charset="-127"/>
+              </a:rPr>
+              <a:t>(last_name)  </a:t>
+            </a:r>
+            <a:r>
+              <a:rPr lang="ko-KR" altLang="en-US" sz="1400">
+                <a:solidFill>
+                  <a:srgbClr val="000000"/>
+                </a:solidFill>
+                <a:latin typeface="맑은 고딕" panose="020B0503020000020004" pitchFamily="50" charset="-127"/>
+                <a:ea typeface="맑은 고딕" panose="020B0503020000020004" pitchFamily="50" charset="-127"/>
+              </a:rPr>
+              <a:t>그 다음으로는 이름</a:t>
+            </a:r>
+            <a:r>
+              <a:rPr lang="en-US" altLang="ko-KR" sz="1400">
+                <a:solidFill>
+                  <a:srgbClr val="000000"/>
+                </a:solidFill>
+                <a:latin typeface="맑은 고딕" panose="020B0503020000020004" pitchFamily="50" charset="-127"/>
+                <a:ea typeface="맑은 고딕" panose="020B0503020000020004" pitchFamily="50" charset="-127"/>
+              </a:rPr>
+              <a:t>(first_name) </a:t>
+            </a:r>
+            <a:r>
+              <a:rPr lang="ko-KR" altLang="en-US" sz="1400">
+                <a:solidFill>
+                  <a:srgbClr val="000000"/>
+                </a:solidFill>
+                <a:latin typeface="맑은 고딕" panose="020B0503020000020004" pitchFamily="50" charset="-127"/>
+                <a:ea typeface="맑은 고딕" panose="020B0503020000020004" pitchFamily="50" charset="-127"/>
+              </a:rPr>
+              <a:t>순서이다</a:t>
             </a:r>
             <a:r>
               <a:rPr lang="en-US" altLang="ko-KR" sz="1400">
@@ -5286,6 +5346,339 @@
               </a:rPr>
               <a:t>.</a:t>
             </a:r>
+            <a:br>
+              <a:rPr lang="en-US" altLang="ko-KR" sz="1400">
+                <a:solidFill>
+                  <a:srgbClr val="000000"/>
+                </a:solidFill>
+                <a:latin typeface="맑은 고딕" panose="020B0503020000020004" pitchFamily="50" charset="-127"/>
+                <a:ea typeface="맑은 고딕" panose="020B0503020000020004" pitchFamily="50" charset="-127"/>
+              </a:rPr>
+            </a:br>
+            <a:br>
+              <a:rPr lang="en-US" altLang="ko-KR" sz="1400">
+                <a:solidFill>
+                  <a:srgbClr val="000000"/>
+                </a:solidFill>
+                <a:latin typeface="맑은 고딕" panose="020B0503020000020004" pitchFamily="50" charset="-127"/>
+                <a:ea typeface="맑은 고딕" panose="020B0503020000020004" pitchFamily="50" charset="-127"/>
+              </a:rPr>
+            </a:br>
+            <a:r>
+              <a:rPr lang="ko-KR" altLang="en-US" sz="1400">
+                <a:solidFill>
+                  <a:srgbClr val="000000"/>
+                </a:solidFill>
+                <a:latin typeface="맑은 고딕" panose="020B0503020000020004" pitchFamily="50" charset="-127"/>
+                <a:ea typeface="맑은 고딕" panose="020B0503020000020004" pitchFamily="50" charset="-127"/>
+              </a:rPr>
+              <a:t>여기서</a:t>
+            </a:r>
+            <a:r>
+              <a:rPr lang="en-US" altLang="ko-KR" sz="1400">
+                <a:solidFill>
+                  <a:srgbClr val="000000"/>
+                </a:solidFill>
+                <a:latin typeface="맑은 고딕" panose="020B0503020000020004" pitchFamily="50" charset="-127"/>
+                <a:ea typeface="맑은 고딕" panose="020B0503020000020004" pitchFamily="50" charset="-127"/>
+              </a:rPr>
+              <a:t>, </a:t>
+            </a:r>
+            <a:r>
+              <a:rPr lang="ko-KR" altLang="en-US" sz="1400">
+                <a:solidFill>
+                  <a:srgbClr val="000000"/>
+                </a:solidFill>
+                <a:latin typeface="맑은 고딕" panose="020B0503020000020004" pitchFamily="50" charset="-127"/>
+                <a:ea typeface="맑은 고딕" panose="020B0503020000020004" pitchFamily="50" charset="-127"/>
+              </a:rPr>
+              <a:t>성과 이름을 인덱스로 설정하였다</a:t>
+            </a:r>
+            <a:r>
+              <a:rPr lang="en-US" altLang="ko-KR" sz="1400">
+                <a:solidFill>
+                  <a:srgbClr val="000000"/>
+                </a:solidFill>
+                <a:latin typeface="맑은 고딕" panose="020B0503020000020004" pitchFamily="50" charset="-127"/>
+                <a:ea typeface="맑은 고딕" panose="020B0503020000020004" pitchFamily="50" charset="-127"/>
+              </a:rPr>
+              <a:t>.</a:t>
+            </a:r>
+          </a:p>
+        </p:txBody>
+      </p:sp>
+      <p:pic>
+        <p:nvPicPr>
+          <p:cNvPr id="6" name="그림 5">
+            <a:extLst>
+              <a:ext uri="{FF2B5EF4-FFF2-40B4-BE49-F238E27FC236}">
+                <a16:creationId xmlns:a16="http://schemas.microsoft.com/office/drawing/2014/main" id="{C71C56F4-D998-72A4-47D2-A78561906402}"/>
+              </a:ext>
+            </a:extLst>
+          </p:cNvPr>
+          <p:cNvPicPr>
+            <a:picLocks noChangeAspect="1"/>
+          </p:cNvPicPr>
+          <p:nvPr/>
+        </p:nvPicPr>
+        <p:blipFill>
+          <a:blip r:embed="rId2"/>
+          <a:stretch>
+            <a:fillRect/>
+          </a:stretch>
+        </p:blipFill>
+        <p:spPr>
+          <a:xfrm>
+            <a:off x="823389" y="2907146"/>
+            <a:ext cx="7497221" cy="2514951"/>
+          </a:xfrm>
+          <a:prstGeom prst="rect">
+            <a:avLst/>
+          </a:prstGeom>
+        </p:spPr>
+      </p:pic>
+      <p:sp>
+        <p:nvSpPr>
+          <p:cNvPr id="9" name="TextBox 8">
+            <a:extLst>
+              <a:ext uri="{FF2B5EF4-FFF2-40B4-BE49-F238E27FC236}">
+                <a16:creationId xmlns:a16="http://schemas.microsoft.com/office/drawing/2014/main" id="{9192ECE7-8128-F780-C524-B4EF67801D2E}"/>
+              </a:ext>
+            </a:extLst>
+          </p:cNvPr>
+          <p:cNvSpPr txBox="1">
+            <a:spLocks noChangeArrowheads="1"/>
+          </p:cNvSpPr>
+          <p:nvPr/>
+        </p:nvSpPr>
+        <p:spPr bwMode="auto">
+          <a:xfrm>
+            <a:off x="565684" y="5537522"/>
+            <a:ext cx="7992888" cy="738664"/>
+          </a:xfrm>
+          <a:prstGeom prst="rect">
+            <a:avLst/>
+          </a:prstGeom>
+          <a:noFill/>
+          <a:ln>
+            <a:noFill/>
+          </a:ln>
+          <a:extLst>
+            <a:ext uri="{909E8E84-426E-40DD-AFC4-6F175D3DCCD1}">
+              <a14:hiddenFill xmlns:a14="http://schemas.microsoft.com/office/drawing/2010/main">
+                <a:solidFill>
+                  <a:srgbClr val="FFFFFF"/>
+                </a:solidFill>
+              </a14:hiddenFill>
+            </a:ext>
+            <a:ext uri="{91240B29-F687-4F45-9708-019B960494DF}">
+              <a14:hiddenLine xmlns:a14="http://schemas.microsoft.com/office/drawing/2010/main" w="9525">
+                <a:solidFill>
+                  <a:srgbClr val="000000"/>
+                </a:solidFill>
+                <a:miter lim="800000"/>
+                <a:headEnd/>
+                <a:tailEnd/>
+              </a14:hiddenLine>
+            </a:ext>
+          </a:extLst>
+        </p:spPr>
+        <p:txBody>
+          <a:bodyPr wrap="square">
+            <a:spAutoFit/>
+          </a:bodyPr>
+          <a:lstStyle>
+            <a:lvl1pPr>
+              <a:spcBef>
+                <a:spcPct val="20000"/>
+              </a:spcBef>
+              <a:buChar char="•"/>
+              <a:defRPr sz="3200">
+                <a:solidFill>
+                  <a:schemeClr val="tx1"/>
+                </a:solidFill>
+                <a:latin typeface="Arial" panose="020B0604020202020204" pitchFamily="34" charset="0"/>
+                <a:ea typeface="Arial Unicode MS" panose="020B0604020202020204" pitchFamily="50" charset="-127"/>
+                <a:cs typeface="Arial" panose="020B0604020202020204" pitchFamily="34" charset="0"/>
+              </a:defRPr>
+            </a:lvl1pPr>
+            <a:lvl2pPr marL="742950" indent="-285750">
+              <a:spcBef>
+                <a:spcPct val="20000"/>
+              </a:spcBef>
+              <a:buChar char="–"/>
+              <a:defRPr sz="2800">
+                <a:solidFill>
+                  <a:schemeClr val="tx1"/>
+                </a:solidFill>
+                <a:latin typeface="Arial" panose="020B0604020202020204" pitchFamily="34" charset="0"/>
+                <a:ea typeface="Arial Unicode MS" panose="020B0604020202020204" pitchFamily="50" charset="-127"/>
+                <a:cs typeface="Arial" panose="020B0604020202020204" pitchFamily="34" charset="0"/>
+              </a:defRPr>
+            </a:lvl2pPr>
+            <a:lvl3pPr marL="1143000" indent="-228600">
+              <a:spcBef>
+                <a:spcPct val="20000"/>
+              </a:spcBef>
+              <a:buChar char="•"/>
+              <a:defRPr sz="2400">
+                <a:solidFill>
+                  <a:schemeClr val="tx1"/>
+                </a:solidFill>
+                <a:latin typeface="Arial" panose="020B0604020202020204" pitchFamily="34" charset="0"/>
+                <a:ea typeface="Arial Unicode MS" panose="020B0604020202020204" pitchFamily="50" charset="-127"/>
+                <a:cs typeface="Arial" panose="020B0604020202020204" pitchFamily="34" charset="0"/>
+              </a:defRPr>
+            </a:lvl3pPr>
+            <a:lvl4pPr marL="1600200" indent="-228600">
+              <a:spcBef>
+                <a:spcPct val="20000"/>
+              </a:spcBef>
+              <a:buChar char="–"/>
+              <a:defRPr sz="2000">
+                <a:solidFill>
+                  <a:schemeClr val="tx1"/>
+                </a:solidFill>
+                <a:latin typeface="Arial" panose="020B0604020202020204" pitchFamily="34" charset="0"/>
+                <a:ea typeface="Arial Unicode MS" panose="020B0604020202020204" pitchFamily="50" charset="-127"/>
+                <a:cs typeface="Arial" panose="020B0604020202020204" pitchFamily="34" charset="0"/>
+              </a:defRPr>
+            </a:lvl4pPr>
+            <a:lvl5pPr marL="2057400" indent="-228600">
+              <a:spcBef>
+                <a:spcPct val="20000"/>
+              </a:spcBef>
+              <a:buChar char="»"/>
+              <a:defRPr sz="2000">
+                <a:solidFill>
+                  <a:schemeClr val="tx1"/>
+                </a:solidFill>
+                <a:latin typeface="Arial" panose="020B0604020202020204" pitchFamily="34" charset="0"/>
+                <a:ea typeface="Arial Unicode MS" panose="020B0604020202020204" pitchFamily="50" charset="-127"/>
+                <a:cs typeface="Arial" panose="020B0604020202020204" pitchFamily="34" charset="0"/>
+              </a:defRPr>
+            </a:lvl5pPr>
+            <a:lvl6pPr marL="2514600" indent="-228600" eaLnBrk="0" fontAlgn="base" hangingPunct="0">
+              <a:spcBef>
+                <a:spcPct val="20000"/>
+              </a:spcBef>
+              <a:spcAft>
+                <a:spcPct val="0"/>
+              </a:spcAft>
+              <a:buChar char="»"/>
+              <a:defRPr sz="2000">
+                <a:solidFill>
+                  <a:schemeClr val="tx1"/>
+                </a:solidFill>
+                <a:latin typeface="Arial" panose="020B0604020202020204" pitchFamily="34" charset="0"/>
+                <a:ea typeface="Arial Unicode MS" panose="020B0604020202020204" pitchFamily="50" charset="-127"/>
+                <a:cs typeface="Arial" panose="020B0604020202020204" pitchFamily="34" charset="0"/>
+              </a:defRPr>
+            </a:lvl6pPr>
+            <a:lvl7pPr marL="2971800" indent="-228600" eaLnBrk="0" fontAlgn="base" hangingPunct="0">
+              <a:spcBef>
+                <a:spcPct val="20000"/>
+              </a:spcBef>
+              <a:spcAft>
+                <a:spcPct val="0"/>
+              </a:spcAft>
+              <a:buChar char="»"/>
+              <a:defRPr sz="2000">
+                <a:solidFill>
+                  <a:schemeClr val="tx1"/>
+                </a:solidFill>
+                <a:latin typeface="Arial" panose="020B0604020202020204" pitchFamily="34" charset="0"/>
+                <a:ea typeface="Arial Unicode MS" panose="020B0604020202020204" pitchFamily="50" charset="-127"/>
+                <a:cs typeface="Arial" panose="020B0604020202020204" pitchFamily="34" charset="0"/>
+              </a:defRPr>
+            </a:lvl7pPr>
+            <a:lvl8pPr marL="3429000" indent="-228600" eaLnBrk="0" fontAlgn="base" hangingPunct="0">
+              <a:spcBef>
+                <a:spcPct val="20000"/>
+              </a:spcBef>
+              <a:spcAft>
+                <a:spcPct val="0"/>
+              </a:spcAft>
+              <a:buChar char="»"/>
+              <a:defRPr sz="2000">
+                <a:solidFill>
+                  <a:schemeClr val="tx1"/>
+                </a:solidFill>
+                <a:latin typeface="Arial" panose="020B0604020202020204" pitchFamily="34" charset="0"/>
+                <a:ea typeface="Arial Unicode MS" panose="020B0604020202020204" pitchFamily="50" charset="-127"/>
+                <a:cs typeface="Arial" panose="020B0604020202020204" pitchFamily="34" charset="0"/>
+              </a:defRPr>
+            </a:lvl8pPr>
+            <a:lvl9pPr marL="3886200" indent="-228600" eaLnBrk="0" fontAlgn="base" hangingPunct="0">
+              <a:spcBef>
+                <a:spcPct val="20000"/>
+              </a:spcBef>
+              <a:spcAft>
+                <a:spcPct val="0"/>
+              </a:spcAft>
+              <a:buChar char="»"/>
+              <a:defRPr sz="2000">
+                <a:solidFill>
+                  <a:schemeClr val="tx1"/>
+                </a:solidFill>
+                <a:latin typeface="Arial" panose="020B0604020202020204" pitchFamily="34" charset="0"/>
+                <a:ea typeface="Arial Unicode MS" panose="020B0604020202020204" pitchFamily="50" charset="-127"/>
+                <a:cs typeface="Arial" panose="020B0604020202020204" pitchFamily="34" charset="0"/>
+              </a:defRPr>
+            </a:lvl9pPr>
+          </a:lstStyle>
+          <a:p>
+            <a:pPr eaLnBrk="1" hangingPunct="1">
+              <a:spcBef>
+                <a:spcPct val="0"/>
+              </a:spcBef>
+              <a:buNone/>
+            </a:pPr>
+            <a:r>
+              <a:rPr lang="ko-KR" altLang="en-US" sz="1400">
+                <a:solidFill>
+                  <a:srgbClr val="000000"/>
+                </a:solidFill>
+                <a:latin typeface="맑은 고딕" panose="020B0503020000020004" pitchFamily="50" charset="-127"/>
+                <a:ea typeface="맑은 고딕" panose="020B0503020000020004" pitchFamily="50" charset="-127"/>
+              </a:rPr>
+              <a:t>성을 찾는 인덱스는 적절</a:t>
+            </a:r>
+            <a:br>
+              <a:rPr lang="en-US" altLang="ko-KR" sz="1400">
+                <a:solidFill>
+                  <a:srgbClr val="000000"/>
+                </a:solidFill>
+                <a:latin typeface="맑은 고딕" panose="020B0503020000020004" pitchFamily="50" charset="-127"/>
+                <a:ea typeface="맑은 고딕" panose="020B0503020000020004" pitchFamily="50" charset="-127"/>
+              </a:rPr>
+            </a:br>
+            <a:br>
+              <a:rPr lang="en-US" altLang="ko-KR" sz="1400">
+                <a:solidFill>
+                  <a:srgbClr val="000000"/>
+                </a:solidFill>
+                <a:latin typeface="맑은 고딕" panose="020B0503020000020004" pitchFamily="50" charset="-127"/>
+                <a:ea typeface="맑은 고딕" panose="020B0503020000020004" pitchFamily="50" charset="-127"/>
+              </a:rPr>
+            </a:br>
+            <a:r>
+              <a:rPr lang="ko-KR" altLang="en-US" sz="1400">
+                <a:solidFill>
+                  <a:srgbClr val="000000"/>
+                </a:solidFill>
+                <a:latin typeface="맑은 고딕" panose="020B0503020000020004" pitchFamily="50" charset="-127"/>
+                <a:ea typeface="맑은 고딕" panose="020B0503020000020004" pitchFamily="50" charset="-127"/>
+              </a:rPr>
+              <a:t>이름을 찾는 인덱스는 부적절</a:t>
+            </a:r>
+            <a:endParaRPr lang="en-US" altLang="ko-KR" sz="1400">
+              <a:solidFill>
+                <a:srgbClr val="000000"/>
+              </a:solidFill>
+              <a:latin typeface="맑은 고딕" panose="020B0503020000020004" pitchFamily="50" charset="-127"/>
+              <a:ea typeface="맑은 고딕" panose="020B0503020000020004" pitchFamily="50" charset="-127"/>
+            </a:endParaRPr>
           </a:p>
         </p:txBody>
       </p:sp>
@@ -5299,6 +5692,111 @@
   <p:clrMapOvr>
     <a:masterClrMapping/>
   </p:clrMapOvr>
+  <p:timing>
+    <p:tnLst>
+      <p:par>
+        <p:cTn id="1" dur="indefinite" restart="never" nodeType="tmRoot">
+          <p:childTnLst>
+            <p:seq concurrent="1" nextAc="seek">
+              <p:cTn id="2" dur="indefinite" nodeType="mainSeq">
+                <p:childTnLst>
+                  <p:par>
+                    <p:cTn id="3" fill="hold">
+                      <p:stCondLst>
+                        <p:cond delay="indefinite"/>
+                      </p:stCondLst>
+                      <p:childTnLst>
+                        <p:par>
+                          <p:cTn id="4" fill="hold">
+                            <p:stCondLst>
+                              <p:cond delay="0"/>
+                            </p:stCondLst>
+                            <p:childTnLst>
+                              <p:par>
+                                <p:cTn id="5" presetID="1" presetClass="entr" presetSubtype="0" fill="hold" nodeType="clickEffect">
+                                  <p:stCondLst>
+                                    <p:cond delay="0"/>
+                                  </p:stCondLst>
+                                  <p:childTnLst>
+                                    <p:set>
+                                      <p:cBhvr>
+                                        <p:cTn id="6" dur="1" fill="hold">
+                                          <p:stCondLst>
+                                            <p:cond delay="0"/>
+                                          </p:stCondLst>
+                                        </p:cTn>
+                                        <p:tgtEl>
+                                          <p:spTgt spid="6"/>
+                                        </p:tgtEl>
+                                        <p:attrNameLst>
+                                          <p:attrName>style.visibility</p:attrName>
+                                        </p:attrNameLst>
+                                      </p:cBhvr>
+                                      <p:to>
+                                        <p:strVal val="visible"/>
+                                      </p:to>
+                                    </p:set>
+                                  </p:childTnLst>
+                                </p:cTn>
+                              </p:par>
+                              <p:par>
+                                <p:cTn id="7" presetID="1" presetClass="entr" presetSubtype="0" fill="hold" grpId="0" nodeType="withEffect">
+                                  <p:stCondLst>
+                                    <p:cond delay="0"/>
+                                  </p:stCondLst>
+                                  <p:childTnLst>
+                                    <p:set>
+                                      <p:cBhvr>
+                                        <p:cTn id="8" dur="1" fill="hold">
+                                          <p:stCondLst>
+                                            <p:cond delay="0"/>
+                                          </p:stCondLst>
+                                        </p:cTn>
+                                        <p:tgtEl>
+                                          <p:spTgt spid="9"/>
+                                        </p:tgtEl>
+                                        <p:attrNameLst>
+                                          <p:attrName>style.visibility</p:attrName>
+                                        </p:attrNameLst>
+                                      </p:cBhvr>
+                                      <p:to>
+                                        <p:strVal val="visible"/>
+                                      </p:to>
+                                    </p:set>
+                                  </p:childTnLst>
+                                </p:cTn>
+                              </p:par>
+                            </p:childTnLst>
+                          </p:cTn>
+                        </p:par>
+                      </p:childTnLst>
+                    </p:cTn>
+                  </p:par>
+                </p:childTnLst>
+              </p:cTn>
+              <p:prevCondLst>
+                <p:cond evt="onPrev" delay="0">
+                  <p:tgtEl>
+                    <p:sldTgt/>
+                  </p:tgtEl>
+                </p:cond>
+              </p:prevCondLst>
+              <p:nextCondLst>
+                <p:cond evt="onNext" delay="0">
+                  <p:tgtEl>
+                    <p:sldTgt/>
+                  </p:tgtEl>
+                </p:cond>
+              </p:nextCondLst>
+            </p:seq>
+          </p:childTnLst>
+        </p:cTn>
+      </p:par>
+    </p:tnLst>
+    <p:bldLst>
+      <p:bldP spid="9" grpId="0"/>
+    </p:bldLst>
+  </p:timing>
 </p:sld>
 </file>
 
@@ -6444,7 +6942,7 @@
                   <a:ea typeface="맑은 고딕" panose="020B0503020000020004" pitchFamily="50" charset="-127"/>
                   <a:cs typeface="Arial" panose="020B0604020202020204" pitchFamily="34" charset="0"/>
                 </a:rPr>
-                <a:t>인덱스 안티 패턴</a:t>
+                <a:t>인덱스 사례</a:t>
               </a:r>
               <a:endParaRPr lang="ko-KR" altLang="en-US" sz="1800" dirty="0">
                 <a:latin typeface="맑은 고딕" panose="020B0503020000020004" pitchFamily="50" charset="-127"/>
@@ -8404,7 +8902,82 @@
                             </p:stCondLst>
                             <p:childTnLst>
                               <p:par>
-                                <p:cTn id="5" presetID="18" presetClass="emph" presetSubtype="0" fill="hold" grpId="0" nodeType="clickEffect">
+                                <p:cTn id="5" presetID="1" presetClass="entr" presetSubtype="0" fill="hold" grpId="1" nodeType="clickEffect">
+                                  <p:stCondLst>
+                                    <p:cond delay="0"/>
+                                  </p:stCondLst>
+                                  <p:iterate type="lt">
+                                    <p:tmAbs val="0"/>
+                                  </p:iterate>
+                                  <p:childTnLst>
+                                    <p:set>
+                                      <p:cBhvr>
+                                        <p:cTn id="6" dur="1" fill="hold">
+                                          <p:stCondLst>
+                                            <p:cond delay="0"/>
+                                          </p:stCondLst>
+                                        </p:cTn>
+                                        <p:tgtEl>
+                                          <p:spTgt spid="7"/>
+                                        </p:tgtEl>
+                                        <p:attrNameLst>
+                                          <p:attrName>style.visibility</p:attrName>
+                                        </p:attrNameLst>
+                                      </p:cBhvr>
+                                      <p:to>
+                                        <p:strVal val="visible"/>
+                                      </p:to>
+                                    </p:set>
+                                  </p:childTnLst>
+                                </p:cTn>
+                              </p:par>
+                              <p:par>
+                                <p:cTn id="7" presetID="1" presetClass="entr" presetSubtype="0" fill="hold" grpId="0" nodeType="withEffect">
+                                  <p:stCondLst>
+                                    <p:cond delay="0"/>
+                                  </p:stCondLst>
+                                  <p:childTnLst>
+                                    <p:set>
+                                      <p:cBhvr>
+                                        <p:cTn id="8" dur="1" fill="hold">
+                                          <p:stCondLst>
+                                            <p:cond delay="0"/>
+                                          </p:stCondLst>
+                                        </p:cTn>
+                                        <p:tgtEl>
+                                          <p:spTgt spid="8"/>
+                                        </p:tgtEl>
+                                        <p:attrNameLst>
+                                          <p:attrName>style.visibility</p:attrName>
+                                        </p:attrNameLst>
+                                      </p:cBhvr>
+                                      <p:to>
+                                        <p:strVal val="visible"/>
+                                      </p:to>
+                                    </p:set>
+                                  </p:childTnLst>
+                                </p:cTn>
+                              </p:par>
+                            </p:childTnLst>
+                          </p:cTn>
+                        </p:par>
+                      </p:childTnLst>
+                    </p:cTn>
+                  </p:par>
+                  <p:par>
+                    <p:cTn id="9" fill="hold">
+                      <p:stCondLst>
+                        <p:cond delay="indefinite"/>
+                      </p:stCondLst>
+                      <p:childTnLst>
+                        <p:par>
+                          <p:cTn id="10" fill="hold">
+                            <p:stCondLst>
+                              <p:cond delay="0"/>
+                            </p:stCondLst>
+                            <p:childTnLst>
+                              <p:par>
+                                <p:cTn id="11" presetID="18" presetClass="emph" presetSubtype="0" fill="hold" grpId="0" nodeType="clickEffect">
                                   <p:stCondLst>
                                     <p:cond delay="0"/>
                                   </p:stCondLst>
@@ -8414,7 +8987,7 @@
                                   <p:childTnLst>
                                     <p:set>
                                       <p:cBhvr override="childStyle">
-                                        <p:cTn id="6" dur="500" fill="hold"/>
+                                        <p:cTn id="12" dur="500" fill="hold"/>
                                         <p:tgtEl>
                                           <p:spTgt spid="7"/>
                                         </p:tgtEl>
@@ -8458,6 +9031,8 @@
     </p:tnLst>
     <p:bldLst>
       <p:bldP spid="7" grpId="0"/>
+      <p:bldP spid="7" grpId="1"/>
+      <p:bldP spid="8" grpId="0"/>
     </p:bldLst>
   </p:timing>
 </p:sld>
@@ -9134,41 +9709,11 @@
                 <a:latin typeface="맑은 고딕" panose="020B0503020000020004" pitchFamily="50" charset="-127"/>
                 <a:ea typeface="맑은 고딕" panose="020B0503020000020004" pitchFamily="50" charset="-127"/>
               </a:rPr>
-              <a:t>.</a:t>
+              <a:t>. </a:t>
             </a:r>
           </a:p>
         </p:txBody>
       </p:sp>
-      <p:pic>
-        <p:nvPicPr>
-          <p:cNvPr id="4" name="그림 3">
-            <a:extLst>
-              <a:ext uri="{FF2B5EF4-FFF2-40B4-BE49-F238E27FC236}">
-                <a16:creationId xmlns:a16="http://schemas.microsoft.com/office/drawing/2014/main" id="{968CF8C6-FF1D-0681-6BD9-841ACBE07B5E}"/>
-              </a:ext>
-            </a:extLst>
-          </p:cNvPr>
-          <p:cNvPicPr>
-            <a:picLocks noChangeAspect="1"/>
-          </p:cNvPicPr>
-          <p:nvPr/>
-        </p:nvPicPr>
-        <p:blipFill>
-          <a:blip r:embed="rId2"/>
-          <a:stretch>
-            <a:fillRect/>
-          </a:stretch>
-        </p:blipFill>
-        <p:spPr>
-          <a:xfrm>
-            <a:off x="199415" y="2731303"/>
-            <a:ext cx="8745170" cy="1124107"/>
-          </a:xfrm>
-          <a:prstGeom prst="rect">
-            <a:avLst/>
-          </a:prstGeom>
-        </p:spPr>
-      </p:pic>
       <p:sp>
         <p:nvSpPr>
           <p:cNvPr id="11" name="TextBox 10">
@@ -9820,6 +10365,36 @@
           </a:p>
         </p:txBody>
       </p:sp>
+      <p:pic>
+        <p:nvPicPr>
+          <p:cNvPr id="5" name="그림 4">
+            <a:extLst>
+              <a:ext uri="{FF2B5EF4-FFF2-40B4-BE49-F238E27FC236}">
+                <a16:creationId xmlns:a16="http://schemas.microsoft.com/office/drawing/2014/main" id="{D3247453-87EF-9AA3-353D-5CE871B5AC32}"/>
+              </a:ext>
+            </a:extLst>
+          </p:cNvPr>
+          <p:cNvPicPr>
+            <a:picLocks noChangeAspect="1"/>
+          </p:cNvPicPr>
+          <p:nvPr/>
+        </p:nvPicPr>
+        <p:blipFill>
+          <a:blip r:embed="rId2"/>
+          <a:stretch>
+            <a:fillRect/>
+          </a:stretch>
+        </p:blipFill>
+        <p:spPr>
+          <a:xfrm>
+            <a:off x="223230" y="2753260"/>
+            <a:ext cx="8697539" cy="1066949"/>
+          </a:xfrm>
+          <a:prstGeom prst="rect">
+            <a:avLst/>
+          </a:prstGeom>
+        </p:spPr>
+      </p:pic>
     </p:spTree>
     <p:extLst>
       <p:ext uri="{BB962C8B-B14F-4D97-AF65-F5344CB8AC3E}">
@@ -9830,6 +10405,112 @@
   <p:clrMapOvr>
     <a:masterClrMapping/>
   </p:clrMapOvr>
+  <p:timing>
+    <p:tnLst>
+      <p:par>
+        <p:cTn id="1" dur="indefinite" restart="never" nodeType="tmRoot">
+          <p:childTnLst>
+            <p:seq concurrent="1" nextAc="seek">
+              <p:cTn id="2" dur="indefinite" nodeType="mainSeq">
+                <p:childTnLst>
+                  <p:par>
+                    <p:cTn id="3" fill="hold">
+                      <p:stCondLst>
+                        <p:cond delay="indefinite"/>
+                      </p:stCondLst>
+                      <p:childTnLst>
+                        <p:par>
+                          <p:cTn id="4" fill="hold">
+                            <p:stCondLst>
+                              <p:cond delay="0"/>
+                            </p:stCondLst>
+                            <p:childTnLst>
+                              <p:par>
+                                <p:cTn id="5" presetID="1" presetClass="entr" presetSubtype="0" fill="hold" grpId="0" nodeType="clickEffect">
+                                  <p:stCondLst>
+                                    <p:cond delay="0"/>
+                                  </p:stCondLst>
+                                  <p:childTnLst>
+                                    <p:set>
+                                      <p:cBhvr>
+                                        <p:cTn id="6" dur="1" fill="hold">
+                                          <p:stCondLst>
+                                            <p:cond delay="0"/>
+                                          </p:stCondLst>
+                                        </p:cTn>
+                                        <p:tgtEl>
+                                          <p:spTgt spid="11"/>
+                                        </p:tgtEl>
+                                        <p:attrNameLst>
+                                          <p:attrName>style.visibility</p:attrName>
+                                        </p:attrNameLst>
+                                      </p:cBhvr>
+                                      <p:to>
+                                        <p:strVal val="visible"/>
+                                      </p:to>
+                                    </p:set>
+                                  </p:childTnLst>
+                                </p:cTn>
+                              </p:par>
+                              <p:par>
+                                <p:cTn id="7" presetID="1" presetClass="entr" presetSubtype="0" fill="hold" grpId="0" nodeType="withEffect">
+                                  <p:stCondLst>
+                                    <p:cond delay="0"/>
+                                  </p:stCondLst>
+                                  <p:childTnLst>
+                                    <p:set>
+                                      <p:cBhvr>
+                                        <p:cTn id="8" dur="1" fill="hold">
+                                          <p:stCondLst>
+                                            <p:cond delay="0"/>
+                                          </p:stCondLst>
+                                        </p:cTn>
+                                        <p:tgtEl>
+                                          <p:spTgt spid="12"/>
+                                        </p:tgtEl>
+                                        <p:attrNameLst>
+                                          <p:attrName>style.visibility</p:attrName>
+                                        </p:attrNameLst>
+                                      </p:cBhvr>
+                                      <p:to>
+                                        <p:strVal val="visible"/>
+                                      </p:to>
+                                    </p:set>
+                                  </p:childTnLst>
+                                </p:cTn>
+                              </p:par>
+                            </p:childTnLst>
+                          </p:cTn>
+                        </p:par>
+                      </p:childTnLst>
+                    </p:cTn>
+                  </p:par>
+                </p:childTnLst>
+              </p:cTn>
+              <p:prevCondLst>
+                <p:cond evt="onPrev" delay="0">
+                  <p:tgtEl>
+                    <p:sldTgt/>
+                  </p:tgtEl>
+                </p:cond>
+              </p:prevCondLst>
+              <p:nextCondLst>
+                <p:cond evt="onNext" delay="0">
+                  <p:tgtEl>
+                    <p:sldTgt/>
+                  </p:tgtEl>
+                </p:cond>
+              </p:nextCondLst>
+            </p:seq>
+          </p:childTnLst>
+        </p:cTn>
+      </p:par>
+    </p:tnLst>
+    <p:bldLst>
+      <p:bldP spid="11" grpId="0"/>
+      <p:bldP spid="12" grpId="0"/>
+    </p:bldLst>
+  </p:timing>
 </p:sld>
 </file>
 
@@ -12736,6 +13417,52 @@
           </a:prstGeom>
         </p:spPr>
       </p:pic>
+      <p:cxnSp>
+        <p:nvCxnSpPr>
+          <p:cNvPr id="14" name="직선 연결선 13">
+            <a:extLst>
+              <a:ext uri="{FF2B5EF4-FFF2-40B4-BE49-F238E27FC236}">
+                <a16:creationId xmlns:a16="http://schemas.microsoft.com/office/drawing/2014/main" id="{580AA739-182C-272B-7392-0E049D66B594}"/>
+              </a:ext>
+            </a:extLst>
+          </p:cNvPr>
+          <p:cNvCxnSpPr/>
+          <p:nvPr/>
+        </p:nvCxnSpPr>
+        <p:spPr bwMode="auto">
+          <a:xfrm>
+            <a:off x="107504" y="5211873"/>
+            <a:ext cx="4680520" cy="0"/>
+          </a:xfrm>
+          <a:prstGeom prst="line">
+            <a:avLst/>
+          </a:prstGeom>
+          <a:solidFill>
+            <a:schemeClr val="accent1"/>
+          </a:solidFill>
+          <a:ln w="9525" cap="flat" cmpd="sng" algn="ctr">
+            <a:solidFill>
+              <a:schemeClr val="tx1"/>
+            </a:solidFill>
+            <a:prstDash val="solid"/>
+            <a:round/>
+            <a:headEnd type="none" w="med" len="med"/>
+            <a:tailEnd type="none" w="med" len="med"/>
+          </a:ln>
+          <a:effectLst/>
+          <a:extLst>
+            <a:ext uri="{AF507438-7753-43E0-B8FC-AC1667EBCBE1}">
+              <a14:hiddenEffects xmlns:a14="http://schemas.microsoft.com/office/drawing/2010/main">
+                <a:effectLst>
+                  <a:outerShdw dist="35921" dir="2700000" algn="ctr" rotWithShape="0">
+                    <a:schemeClr val="bg2"/>
+                  </a:outerShdw>
+                </a:effectLst>
+              </a14:hiddenEffects>
+            </a:ext>
+          </a:extLst>
+        </p:spPr>
+      </p:cxnSp>
     </p:spTree>
     <p:extLst>
       <p:ext uri="{BB962C8B-B14F-4D97-AF65-F5344CB8AC3E}">

</xml_diff>

<commit_message>
:white_check_mark: Solve why index left removed record
</commit_message>
<xml_diff>
--- a/20/yongki/DatabaseNeeds&Index.pptx
+++ b/20/yongki/DatabaseNeeds&Index.pptx
@@ -249,7 +249,7 @@
           <a:p>
             <a:fld id="{278A5395-7299-4714-9E5C-8983F2B9A6E7}" type="datetimeFigureOut">
               <a:rPr lang="ko-KR" altLang="en-US" smtClean="0"/>
-              <a:t>2022-05-19</a:t>
+              <a:t>2022-05-23</a:t>
             </a:fld>
             <a:endParaRPr lang="ko-KR" altLang="en-US"/>
           </a:p>
@@ -5005,7 +5005,7 @@
                   <a:schemeClr val="tx1"/>
                 </a:solidFill>
               </a:rPr>
-              <a:t>인덱스 사례</a:t>
+              <a:t>잘못된 인덱스 사용 사례</a:t>
             </a:r>
             <a:endParaRPr lang="ko-KR" altLang="ko-KR" sz="2000">
               <a:solidFill>
@@ -5078,7 +5078,7 @@
         <p:spPr bwMode="auto">
           <a:xfrm>
             <a:off x="565684" y="1435903"/>
-            <a:ext cx="7992888" cy="954107"/>
+            <a:ext cx="7992888" cy="738664"/>
           </a:xfrm>
           <a:prstGeom prst="rect">
             <a:avLst/>
@@ -5266,7 +5266,7 @@
                 <a:latin typeface="맑은 고딕" panose="020B0503020000020004" pitchFamily="50" charset="-127"/>
                 <a:ea typeface="맑은 고딕" panose="020B0503020000020004" pitchFamily="50" charset="-127"/>
               </a:rPr>
-              <a:t>전화번호부에 대한 테이블에 </a:t>
+              <a:t>고용자들에 대한 테이블에 성</a:t>
             </a:r>
             <a:r>
               <a:rPr lang="en-US" altLang="ko-KR" sz="1400">
@@ -5276,7 +5276,7 @@
                 <a:latin typeface="맑은 고딕" panose="020B0503020000020004" pitchFamily="50" charset="-127"/>
                 <a:ea typeface="맑은 고딕" panose="020B0503020000020004" pitchFamily="50" charset="-127"/>
               </a:rPr>
-              <a:t>“</a:t>
+              <a:t>(last_name),</a:t>
             </a:r>
             <a:r>
               <a:rPr lang="ko-KR" altLang="en-US" sz="1400">
@@ -5286,7 +5286,7 @@
                 <a:latin typeface="맑은 고딕" panose="020B0503020000020004" pitchFamily="50" charset="-127"/>
                 <a:ea typeface="맑은 고딕" panose="020B0503020000020004" pitchFamily="50" charset="-127"/>
               </a:rPr>
-              <a:t>김길동</a:t>
+              <a:t>이름</a:t>
             </a:r>
             <a:r>
               <a:rPr lang="en-US" altLang="ko-KR" sz="1400">
@@ -5296,7 +5296,7 @@
                 <a:latin typeface="맑은 고딕" panose="020B0503020000020004" pitchFamily="50" charset="-127"/>
                 <a:ea typeface="맑은 고딕" panose="020B0503020000020004" pitchFamily="50" charset="-127"/>
               </a:rPr>
-              <a:t>”</a:t>
+              <a:t>(first_name) </a:t>
             </a:r>
             <a:r>
               <a:rPr lang="ko-KR" altLang="en-US" sz="1400">
@@ -5306,7 +5306,17 @@
                 <a:latin typeface="맑은 고딕" panose="020B0503020000020004" pitchFamily="50" charset="-127"/>
                 <a:ea typeface="맑은 고딕" panose="020B0503020000020004" pitchFamily="50" charset="-127"/>
               </a:rPr>
-              <a:t>을 빠른 탐색 하고 싶은 상황</a:t>
+              <a:t>순서로 찾아오려고 한다</a:t>
+            </a:r>
+            <a:r>
+              <a:rPr lang="en-US" altLang="ko-KR" sz="1400">
+                <a:solidFill>
+                  <a:srgbClr val="000000"/>
+                </a:solidFill>
+                <a:latin typeface="맑은 고딕" panose="020B0503020000020004" pitchFamily="50" charset="-127"/>
+                <a:ea typeface="맑은 고딕" panose="020B0503020000020004" pitchFamily="50" charset="-127"/>
+              </a:rPr>
+              <a:t>.</a:t>
             </a:r>
             <a:br>
               <a:rPr lang="en-US" altLang="ko-KR" sz="1400">
@@ -5334,47 +5344,7 @@
                 <a:latin typeface="맑은 고딕" panose="020B0503020000020004" pitchFamily="50" charset="-127"/>
                 <a:ea typeface="맑은 고딕" panose="020B0503020000020004" pitchFamily="50" charset="-127"/>
               </a:rPr>
-              <a:t>전화번호부의 정렬은 성</a:t>
-            </a:r>
-            <a:r>
-              <a:rPr lang="en-US" altLang="ko-KR" sz="1400">
-                <a:solidFill>
-                  <a:srgbClr val="000000"/>
-                </a:solidFill>
-                <a:latin typeface="맑은 고딕" panose="020B0503020000020004" pitchFamily="50" charset="-127"/>
-                <a:ea typeface="맑은 고딕" panose="020B0503020000020004" pitchFamily="50" charset="-127"/>
-              </a:rPr>
-              <a:t>(last_name),</a:t>
-            </a:r>
-            <a:r>
-              <a:rPr lang="ko-KR" altLang="en-US" sz="1400">
-                <a:solidFill>
-                  <a:srgbClr val="000000"/>
-                </a:solidFill>
-                <a:latin typeface="맑은 고딕" panose="020B0503020000020004" pitchFamily="50" charset="-127"/>
-                <a:ea typeface="맑은 고딕" panose="020B0503020000020004" pitchFamily="50" charset="-127"/>
-              </a:rPr>
-              <a:t>이름</a:t>
-            </a:r>
-            <a:r>
-              <a:rPr lang="en-US" altLang="ko-KR" sz="1400">
-                <a:solidFill>
-                  <a:srgbClr val="000000"/>
-                </a:solidFill>
-                <a:latin typeface="맑은 고딕" panose="020B0503020000020004" pitchFamily="50" charset="-127"/>
-                <a:ea typeface="맑은 고딕" panose="020B0503020000020004" pitchFamily="50" charset="-127"/>
-              </a:rPr>
-              <a:t>(first_name) </a:t>
-            </a:r>
-            <a:r>
-              <a:rPr lang="ko-KR" altLang="en-US" sz="1400">
-                <a:solidFill>
-                  <a:srgbClr val="000000"/>
-                </a:solidFill>
-                <a:latin typeface="맑은 고딕" panose="020B0503020000020004" pitchFamily="50" charset="-127"/>
-                <a:ea typeface="맑은 고딕" panose="020B0503020000020004" pitchFamily="50" charset="-127"/>
-              </a:rPr>
-              <a:t>순서이기 때문에 복합 인덱스를 설정하는 것이 적절하다</a:t>
+              <a:t>이 순서에 맞게 멀티 칼럼 인덱스를 설정하는 것이 적절하다</a:t>
             </a:r>
             <a:r>
               <a:rPr lang="en-US" altLang="ko-KR" sz="1400">
@@ -5406,7 +5376,7 @@
         <p:spPr bwMode="auto">
           <a:xfrm>
             <a:off x="565684" y="4095086"/>
-            <a:ext cx="7992888" cy="738664"/>
+            <a:ext cx="7992888" cy="954107"/>
           </a:xfrm>
           <a:prstGeom prst="rect">
             <a:avLst/>
@@ -5587,44 +5557,24 @@
               <a:buNone/>
             </a:pPr>
             <a:r>
-              <a:rPr lang="ko-KR" altLang="en-US" sz="1400">
+              <a:rPr lang="en-US" altLang="ko-KR" sz="1400">
                 <a:solidFill>
                   <a:srgbClr val="000000"/>
                 </a:solidFill>
                 <a:latin typeface="맑은 고딕" panose="020B0503020000020004" pitchFamily="50" charset="-127"/>
                 <a:ea typeface="맑은 고딕" panose="020B0503020000020004" pitchFamily="50" charset="-127"/>
               </a:rPr>
-              <a:t>이름만 인덱스를 설정하여 찾아낸다고 했을 때</a:t>
-            </a:r>
-            <a:r>
-              <a:rPr lang="en-US" altLang="ko-KR" sz="1400">
+              <a:t>30</a:t>
+            </a:r>
+            <a:r>
+              <a:rPr lang="ko-KR" altLang="en-US" sz="1400">
                 <a:solidFill>
                   <a:srgbClr val="000000"/>
                 </a:solidFill>
                 <a:latin typeface="맑은 고딕" panose="020B0503020000020004" pitchFamily="50" charset="-127"/>
                 <a:ea typeface="맑은 고딕" panose="020B0503020000020004" pitchFamily="50" charset="-127"/>
               </a:rPr>
-              <a:t>, </a:t>
-            </a:r>
-            <a:r>
-              <a:rPr lang="ko-KR" altLang="en-US" sz="1400">
-                <a:solidFill>
-                  <a:srgbClr val="000000"/>
-                </a:solidFill>
-                <a:latin typeface="맑은 고딕" panose="020B0503020000020004" pitchFamily="50" charset="-127"/>
-                <a:ea typeface="맑은 고딕" panose="020B0503020000020004" pitchFamily="50" charset="-127"/>
-              </a:rPr>
-              <a:t>인덱스는 부적절하다</a:t>
-            </a:r>
-            <a:r>
-              <a:rPr lang="en-US" altLang="ko-KR" sz="1400">
-                <a:solidFill>
-                  <a:srgbClr val="000000"/>
-                </a:solidFill>
-                <a:latin typeface="맑은 고딕" panose="020B0503020000020004" pitchFamily="50" charset="-127"/>
-                <a:ea typeface="맑은 고딕" panose="020B0503020000020004" pitchFamily="50" charset="-127"/>
-              </a:rPr>
-              <a:t>.</a:t>
+              <a:t>만 레코드를 보유한 테이블에서 이러한 순서의 차이로 실습을 해본 결과</a:t>
             </a:r>
             <a:br>
               <a:rPr lang="en-US" altLang="ko-KR" sz="1400">
@@ -5652,7 +5602,66 @@
                 <a:latin typeface="맑은 고딕" panose="020B0503020000020004" pitchFamily="50" charset="-127"/>
                 <a:ea typeface="맑은 고딕" panose="020B0503020000020004" pitchFamily="50" charset="-127"/>
               </a:rPr>
-              <a:t>누구든 성과 상관없이 길동이란 이름을 가질 수 있기 때문에 전화번호부 전체에서 찾아야한다</a:t>
+              <a:t>잘못 사용할 시</a:t>
+            </a:r>
+            <a:r>
+              <a:rPr lang="en-US" altLang="ko-KR" sz="1400">
+                <a:solidFill>
+                  <a:srgbClr val="000000"/>
+                </a:solidFill>
+                <a:latin typeface="맑은 고딕" panose="020B0503020000020004" pitchFamily="50" charset="-127"/>
+                <a:ea typeface="맑은 고딕" panose="020B0503020000020004" pitchFamily="50" charset="-127"/>
+              </a:rPr>
+              <a:t>, 669ms</a:t>
+            </a:r>
+            <a:r>
+              <a:rPr lang="ko-KR" altLang="en-US" sz="1400">
+                <a:solidFill>
+                  <a:srgbClr val="000000"/>
+                </a:solidFill>
+                <a:latin typeface="맑은 고딕" panose="020B0503020000020004" pitchFamily="50" charset="-127"/>
+                <a:ea typeface="맑은 고딕" panose="020B0503020000020004" pitchFamily="50" charset="-127"/>
+              </a:rPr>
+              <a:t>의 성능에서</a:t>
+            </a:r>
+            <a:br>
+              <a:rPr lang="en-US" altLang="ko-KR" sz="1400">
+                <a:solidFill>
+                  <a:srgbClr val="000000"/>
+                </a:solidFill>
+                <a:latin typeface="맑은 고딕" panose="020B0503020000020004" pitchFamily="50" charset="-127"/>
+                <a:ea typeface="맑은 고딕" panose="020B0503020000020004" pitchFamily="50" charset="-127"/>
+              </a:rPr>
+            </a:br>
+            <a:r>
+              <a:rPr lang="ko-KR" altLang="en-US" sz="1400">
+                <a:solidFill>
+                  <a:srgbClr val="000000"/>
+                </a:solidFill>
+                <a:latin typeface="맑은 고딕" panose="020B0503020000020004" pitchFamily="50" charset="-127"/>
+                <a:ea typeface="맑은 고딕" panose="020B0503020000020004" pitchFamily="50" charset="-127"/>
+              </a:rPr>
+              <a:t>적절히 사용할 시</a:t>
+            </a:r>
+            <a:r>
+              <a:rPr lang="en-US" altLang="ko-KR" sz="1400">
+                <a:solidFill>
+                  <a:srgbClr val="000000"/>
+                </a:solidFill>
+                <a:latin typeface="맑은 고딕" panose="020B0503020000020004" pitchFamily="50" charset="-127"/>
+                <a:ea typeface="맑은 고딕" panose="020B0503020000020004" pitchFamily="50" charset="-127"/>
+              </a:rPr>
+              <a:t>, 16ms</a:t>
+            </a:r>
+            <a:r>
+              <a:rPr lang="ko-KR" altLang="en-US" sz="1400">
+                <a:solidFill>
+                  <a:srgbClr val="000000"/>
+                </a:solidFill>
+                <a:latin typeface="맑은 고딕" panose="020B0503020000020004" pitchFamily="50" charset="-127"/>
+                <a:ea typeface="맑은 고딕" panose="020B0503020000020004" pitchFamily="50" charset="-127"/>
+              </a:rPr>
+              <a:t>의 성능 향상 효과를 보았다</a:t>
             </a:r>
             <a:r>
               <a:rPr lang="en-US" altLang="ko-KR" sz="1400">
@@ -5669,10 +5678,10 @@
       </p:sp>
       <p:pic>
         <p:nvPicPr>
-          <p:cNvPr id="4" name="그림 3">
+          <p:cNvPr id="5" name="그림 4">
             <a:extLst>
               <a:ext uri="{FF2B5EF4-FFF2-40B4-BE49-F238E27FC236}">
-                <a16:creationId xmlns:a16="http://schemas.microsoft.com/office/drawing/2014/main" id="{2F71C362-B759-9BC3-FE4B-09A749213BED}"/>
+                <a16:creationId xmlns:a16="http://schemas.microsoft.com/office/drawing/2014/main" id="{72223A8B-DA38-E747-A307-2D44DE45FC4C}"/>
               </a:ext>
             </a:extLst>
           </p:cNvPr>
@@ -5689,38 +5698,8 @@
         </p:blipFill>
         <p:spPr>
           <a:xfrm>
-            <a:off x="1958840" y="2310320"/>
-            <a:ext cx="5226319" cy="1644735"/>
-          </a:xfrm>
-          <a:prstGeom prst="rect">
-            <a:avLst/>
-          </a:prstGeom>
-        </p:spPr>
-      </p:pic>
-      <p:pic>
-        <p:nvPicPr>
-          <p:cNvPr id="11" name="그림 10">
-            <a:extLst>
-              <a:ext uri="{FF2B5EF4-FFF2-40B4-BE49-F238E27FC236}">
-                <a16:creationId xmlns:a16="http://schemas.microsoft.com/office/drawing/2014/main" id="{9EEA243C-5834-69F0-9C54-FF0FBCF6A5C4}"/>
-              </a:ext>
-            </a:extLst>
-          </p:cNvPr>
-          <p:cNvPicPr>
-            <a:picLocks noChangeAspect="1"/>
-          </p:cNvPicPr>
-          <p:nvPr/>
-        </p:nvPicPr>
-        <p:blipFill>
-          <a:blip r:embed="rId3"/>
-          <a:stretch>
-            <a:fillRect/>
-          </a:stretch>
-        </p:blipFill>
-        <p:spPr>
-          <a:xfrm>
-            <a:off x="1923106" y="4850602"/>
-            <a:ext cx="5262053" cy="1897303"/>
+            <a:off x="1474133" y="2554399"/>
+            <a:ext cx="6195734" cy="738664"/>
           </a:xfrm>
           <a:prstGeom prst="rect">
             <a:avLst/>
@@ -6963,7 +6942,7 @@
                   <a:ea typeface="맑은 고딕" panose="020B0503020000020004" pitchFamily="50" charset="-127"/>
                   <a:cs typeface="Arial" panose="020B0604020202020204" pitchFamily="34" charset="0"/>
                 </a:rPr>
-                <a:t>인덱스 사례</a:t>
+                <a:t>잘못된 인덱스 사용 사례</a:t>
               </a:r>
               <a:endParaRPr lang="ko-KR" altLang="en-US" sz="1800" dirty="0">
                 <a:latin typeface="맑은 고딕" panose="020B0503020000020004" pitchFamily="50" charset="-127"/>
@@ -12562,7 +12541,7 @@
         <p:spPr bwMode="auto">
           <a:xfrm>
             <a:off x="565684" y="3580051"/>
-            <a:ext cx="7992888" cy="1600438"/>
+            <a:ext cx="4551514" cy="1600438"/>
           </a:xfrm>
           <a:prstGeom prst="rect">
             <a:avLst/>
@@ -12986,341 +12965,6 @@
           </a:prstGeom>
         </p:spPr>
       </p:pic>
-      <p:sp>
-        <p:nvSpPr>
-          <p:cNvPr id="12" name="TextBox 11">
-            <a:extLst>
-              <a:ext uri="{FF2B5EF4-FFF2-40B4-BE49-F238E27FC236}">
-                <a16:creationId xmlns:a16="http://schemas.microsoft.com/office/drawing/2014/main" id="{58729007-94A5-459C-4A6C-290A73D0C6B7}"/>
-              </a:ext>
-            </a:extLst>
-          </p:cNvPr>
-          <p:cNvSpPr txBox="1">
-            <a:spLocks noChangeArrowheads="1"/>
-          </p:cNvSpPr>
-          <p:nvPr/>
-        </p:nvSpPr>
-        <p:spPr bwMode="auto">
-          <a:xfrm>
-            <a:off x="542188" y="5357820"/>
-            <a:ext cx="4317843" cy="1471172"/>
-          </a:xfrm>
-          <a:prstGeom prst="rect">
-            <a:avLst/>
-          </a:prstGeom>
-          <a:noFill/>
-          <a:ln w="9525">
-            <a:noFill/>
-            <a:miter lim="800000"/>
-            <a:headEnd/>
-            <a:tailEnd/>
-          </a:ln>
-          <a:extLst>
-            <a:ext uri="{909E8E84-426E-40DD-AFC4-6F175D3DCCD1}">
-              <a14:hiddenFill xmlns:a14="http://schemas.microsoft.com/office/drawing/2010/main">
-                <a:solidFill>
-                  <a:srgbClr val="FFFFFF"/>
-                </a:solidFill>
-              </a14:hiddenFill>
-            </a:ext>
-          </a:extLst>
-        </p:spPr>
-        <p:txBody>
-          <a:bodyPr wrap="square">
-            <a:spAutoFit/>
-          </a:bodyPr>
-          <a:lstStyle>
-            <a:lvl1pPr>
-              <a:spcBef>
-                <a:spcPct val="20000"/>
-              </a:spcBef>
-              <a:buChar char="•"/>
-              <a:defRPr sz="3200">
-                <a:solidFill>
-                  <a:schemeClr val="tx1"/>
-                </a:solidFill>
-                <a:latin typeface="Arial" panose="020B0604020202020204" pitchFamily="34" charset="0"/>
-                <a:ea typeface="Arial Unicode MS" panose="020B0604020202020204" pitchFamily="50" charset="-127"/>
-                <a:cs typeface="Arial" panose="020B0604020202020204" pitchFamily="34" charset="0"/>
-              </a:defRPr>
-            </a:lvl1pPr>
-            <a:lvl2pPr marL="742950" indent="-285750">
-              <a:spcBef>
-                <a:spcPct val="20000"/>
-              </a:spcBef>
-              <a:buChar char="–"/>
-              <a:defRPr sz="2800">
-                <a:solidFill>
-                  <a:schemeClr val="tx1"/>
-                </a:solidFill>
-                <a:latin typeface="Arial" panose="020B0604020202020204" pitchFamily="34" charset="0"/>
-                <a:ea typeface="Arial Unicode MS" panose="020B0604020202020204" pitchFamily="50" charset="-127"/>
-                <a:cs typeface="Arial" panose="020B0604020202020204" pitchFamily="34" charset="0"/>
-              </a:defRPr>
-            </a:lvl2pPr>
-            <a:lvl3pPr marL="1143000" indent="-228600">
-              <a:spcBef>
-                <a:spcPct val="20000"/>
-              </a:spcBef>
-              <a:buChar char="•"/>
-              <a:defRPr sz="2400">
-                <a:solidFill>
-                  <a:schemeClr val="tx1"/>
-                </a:solidFill>
-                <a:latin typeface="Arial" panose="020B0604020202020204" pitchFamily="34" charset="0"/>
-                <a:ea typeface="Arial Unicode MS" panose="020B0604020202020204" pitchFamily="50" charset="-127"/>
-                <a:cs typeface="Arial" panose="020B0604020202020204" pitchFamily="34" charset="0"/>
-              </a:defRPr>
-            </a:lvl3pPr>
-            <a:lvl4pPr marL="1600200" indent="-228600">
-              <a:spcBef>
-                <a:spcPct val="20000"/>
-              </a:spcBef>
-              <a:buChar char="–"/>
-              <a:defRPr sz="2000">
-                <a:solidFill>
-                  <a:schemeClr val="tx1"/>
-                </a:solidFill>
-                <a:latin typeface="Arial" panose="020B0604020202020204" pitchFamily="34" charset="0"/>
-                <a:ea typeface="Arial Unicode MS" panose="020B0604020202020204" pitchFamily="50" charset="-127"/>
-                <a:cs typeface="Arial" panose="020B0604020202020204" pitchFamily="34" charset="0"/>
-              </a:defRPr>
-            </a:lvl4pPr>
-            <a:lvl5pPr marL="2057400" indent="-228600">
-              <a:spcBef>
-                <a:spcPct val="20000"/>
-              </a:spcBef>
-              <a:buChar char="»"/>
-              <a:defRPr sz="2000">
-                <a:solidFill>
-                  <a:schemeClr val="tx1"/>
-                </a:solidFill>
-                <a:latin typeface="Arial" panose="020B0604020202020204" pitchFamily="34" charset="0"/>
-                <a:ea typeface="Arial Unicode MS" panose="020B0604020202020204" pitchFamily="50" charset="-127"/>
-                <a:cs typeface="Arial" panose="020B0604020202020204" pitchFamily="34" charset="0"/>
-              </a:defRPr>
-            </a:lvl5pPr>
-            <a:lvl6pPr marL="2514600" indent="-228600" eaLnBrk="0" fontAlgn="base" hangingPunct="0">
-              <a:spcBef>
-                <a:spcPct val="20000"/>
-              </a:spcBef>
-              <a:spcAft>
-                <a:spcPct val="0"/>
-              </a:spcAft>
-              <a:buChar char="»"/>
-              <a:defRPr sz="2000">
-                <a:solidFill>
-                  <a:schemeClr val="tx1"/>
-                </a:solidFill>
-                <a:latin typeface="Arial" panose="020B0604020202020204" pitchFamily="34" charset="0"/>
-                <a:ea typeface="Arial Unicode MS" panose="020B0604020202020204" pitchFamily="50" charset="-127"/>
-                <a:cs typeface="Arial" panose="020B0604020202020204" pitchFamily="34" charset="0"/>
-              </a:defRPr>
-            </a:lvl6pPr>
-            <a:lvl7pPr marL="2971800" indent="-228600" eaLnBrk="0" fontAlgn="base" hangingPunct="0">
-              <a:spcBef>
-                <a:spcPct val="20000"/>
-              </a:spcBef>
-              <a:spcAft>
-                <a:spcPct val="0"/>
-              </a:spcAft>
-              <a:buChar char="»"/>
-              <a:defRPr sz="2000">
-                <a:solidFill>
-                  <a:schemeClr val="tx1"/>
-                </a:solidFill>
-                <a:latin typeface="Arial" panose="020B0604020202020204" pitchFamily="34" charset="0"/>
-                <a:ea typeface="Arial Unicode MS" panose="020B0604020202020204" pitchFamily="50" charset="-127"/>
-                <a:cs typeface="Arial" panose="020B0604020202020204" pitchFamily="34" charset="0"/>
-              </a:defRPr>
-            </a:lvl7pPr>
-            <a:lvl8pPr marL="3429000" indent="-228600" eaLnBrk="0" fontAlgn="base" hangingPunct="0">
-              <a:spcBef>
-                <a:spcPct val="20000"/>
-              </a:spcBef>
-              <a:spcAft>
-                <a:spcPct val="0"/>
-              </a:spcAft>
-              <a:buChar char="»"/>
-              <a:defRPr sz="2000">
-                <a:solidFill>
-                  <a:schemeClr val="tx1"/>
-                </a:solidFill>
-                <a:latin typeface="Arial" panose="020B0604020202020204" pitchFamily="34" charset="0"/>
-                <a:ea typeface="Arial Unicode MS" panose="020B0604020202020204" pitchFamily="50" charset="-127"/>
-                <a:cs typeface="Arial" panose="020B0604020202020204" pitchFamily="34" charset="0"/>
-              </a:defRPr>
-            </a:lvl8pPr>
-            <a:lvl9pPr marL="3886200" indent="-228600" eaLnBrk="0" fontAlgn="base" hangingPunct="0">
-              <a:spcBef>
-                <a:spcPct val="20000"/>
-              </a:spcBef>
-              <a:spcAft>
-                <a:spcPct val="0"/>
-              </a:spcAft>
-              <a:buChar char="»"/>
-              <a:defRPr sz="2000">
-                <a:solidFill>
-                  <a:schemeClr val="tx1"/>
-                </a:solidFill>
-                <a:latin typeface="Arial" panose="020B0604020202020204" pitchFamily="34" charset="0"/>
-                <a:ea typeface="Arial Unicode MS" panose="020B0604020202020204" pitchFamily="50" charset="-127"/>
-                <a:cs typeface="Arial" panose="020B0604020202020204" pitchFamily="34" charset="0"/>
-              </a:defRPr>
-            </a:lvl9pPr>
-          </a:lstStyle>
-          <a:p>
-            <a:pPr>
-              <a:buNone/>
-            </a:pPr>
-            <a:r>
-              <a:rPr lang="ko-KR" altLang="en-US" sz="1400" b="1">
-                <a:solidFill>
-                  <a:srgbClr val="24292F"/>
-                </a:solidFill>
-                <a:latin typeface="맑은 고딕" panose="020B0503020000020004" pitchFamily="50" charset="-127"/>
-                <a:ea typeface="맑은 고딕" panose="020B0503020000020004" pitchFamily="50" charset="-127"/>
-              </a:rPr>
-              <a:t>인덱스의 특이점</a:t>
-            </a:r>
-            <a:br>
-              <a:rPr lang="en-US" altLang="ko-KR" sz="1400">
-                <a:solidFill>
-                  <a:srgbClr val="24292F"/>
-                </a:solidFill>
-                <a:latin typeface="맑은 고딕" panose="020B0503020000020004" pitchFamily="50" charset="-127"/>
-                <a:ea typeface="맑은 고딕" panose="020B0503020000020004" pitchFamily="50" charset="-127"/>
-              </a:rPr>
-            </a:br>
-            <a:br>
-              <a:rPr lang="en-US" altLang="ko-KR" sz="1400">
-                <a:solidFill>
-                  <a:srgbClr val="24292F"/>
-                </a:solidFill>
-                <a:latin typeface="맑은 고딕" panose="020B0503020000020004" pitchFamily="50" charset="-127"/>
-                <a:ea typeface="맑은 고딕" panose="020B0503020000020004" pitchFamily="50" charset="-127"/>
-              </a:rPr>
-            </a:br>
-            <a:r>
-              <a:rPr lang="ko-KR" altLang="en-US" sz="1400">
-                <a:solidFill>
-                  <a:srgbClr val="24292F"/>
-                </a:solidFill>
-                <a:latin typeface="맑은 고딕" panose="020B0503020000020004" pitchFamily="50" charset="-127"/>
-                <a:ea typeface="맑은 고딕" panose="020B0503020000020004" pitchFamily="50" charset="-127"/>
-              </a:rPr>
-              <a:t>수정</a:t>
-            </a:r>
-            <a:r>
-              <a:rPr lang="en-US" altLang="ko-KR" sz="1400">
-                <a:solidFill>
-                  <a:srgbClr val="24292F"/>
-                </a:solidFill>
-                <a:latin typeface="맑은 고딕" panose="020B0503020000020004" pitchFamily="50" charset="-127"/>
-                <a:ea typeface="맑은 고딕" panose="020B0503020000020004" pitchFamily="50" charset="-127"/>
-              </a:rPr>
-              <a:t>/</a:t>
-            </a:r>
-            <a:r>
-              <a:rPr lang="ko-KR" altLang="en-US" sz="1400">
-                <a:solidFill>
-                  <a:srgbClr val="24292F"/>
-                </a:solidFill>
-                <a:latin typeface="맑은 고딕" panose="020B0503020000020004" pitchFamily="50" charset="-127"/>
-                <a:ea typeface="맑은 고딕" panose="020B0503020000020004" pitchFamily="50" charset="-127"/>
-              </a:rPr>
-              <a:t>삭제 작업에 따른 변경 이전 컬럼을 </a:t>
-            </a:r>
-            <a:r>
-              <a:rPr lang="en-US" altLang="ko-KR" sz="1400">
-                <a:solidFill>
-                  <a:srgbClr val="24292F"/>
-                </a:solidFill>
-                <a:latin typeface="맑은 고딕" panose="020B0503020000020004" pitchFamily="50" charset="-127"/>
-                <a:ea typeface="맑은 고딕" panose="020B0503020000020004" pitchFamily="50" charset="-127"/>
-              </a:rPr>
-              <a:t>‘</a:t>
-            </a:r>
-            <a:r>
-              <a:rPr lang="ko-KR" altLang="en-US" sz="1400">
-                <a:solidFill>
-                  <a:srgbClr val="24292F"/>
-                </a:solidFill>
-                <a:latin typeface="맑은 고딕" panose="020B0503020000020004" pitchFamily="50" charset="-127"/>
-                <a:ea typeface="맑은 고딕" panose="020B0503020000020004" pitchFamily="50" charset="-127"/>
-              </a:rPr>
-              <a:t>사용하지 않음</a:t>
-            </a:r>
-            <a:r>
-              <a:rPr lang="en-US" altLang="ko-KR" sz="1400">
-                <a:solidFill>
-                  <a:srgbClr val="24292F"/>
-                </a:solidFill>
-                <a:latin typeface="맑은 고딕" panose="020B0503020000020004" pitchFamily="50" charset="-127"/>
-                <a:ea typeface="맑은 고딕" panose="020B0503020000020004" pitchFamily="50" charset="-127"/>
-              </a:rPr>
-              <a:t>’</a:t>
-            </a:r>
-            <a:r>
-              <a:rPr lang="ko-KR" altLang="en-US" sz="1400">
-                <a:solidFill>
-                  <a:srgbClr val="24292F"/>
-                </a:solidFill>
-                <a:latin typeface="맑은 고딕" panose="020B0503020000020004" pitchFamily="50" charset="-127"/>
-                <a:ea typeface="맑은 고딕" panose="020B0503020000020004" pitchFamily="50" charset="-127"/>
-              </a:rPr>
-              <a:t>으로 둔다</a:t>
-            </a:r>
-            <a:r>
-              <a:rPr lang="en-US" altLang="ko-KR" sz="1400">
-                <a:solidFill>
-                  <a:srgbClr val="24292F"/>
-                </a:solidFill>
-                <a:latin typeface="맑은 고딕" panose="020B0503020000020004" pitchFamily="50" charset="-127"/>
-                <a:ea typeface="맑은 고딕" panose="020B0503020000020004" pitchFamily="50" charset="-127"/>
-              </a:rPr>
-              <a:t>.</a:t>
-            </a:r>
-          </a:p>
-          <a:p>
-            <a:pPr>
-              <a:buNone/>
-            </a:pPr>
-            <a:endParaRPr lang="en-US" altLang="ko-KR" sz="1400">
-              <a:solidFill>
-                <a:srgbClr val="24292F"/>
-              </a:solidFill>
-              <a:latin typeface="맑은 고딕" panose="020B0503020000020004" pitchFamily="50" charset="-127"/>
-              <a:ea typeface="맑은 고딕" panose="020B0503020000020004" pitchFamily="50" charset="-127"/>
-            </a:endParaRPr>
-          </a:p>
-          <a:p>
-            <a:pPr>
-              <a:buNone/>
-            </a:pPr>
-            <a:r>
-              <a:rPr lang="ko-KR" altLang="en-US" sz="1400" b="1">
-                <a:solidFill>
-                  <a:srgbClr val="24292F"/>
-                </a:solidFill>
-                <a:latin typeface="맑은 고딕" panose="020B0503020000020004" pitchFamily="50" charset="-127"/>
-                <a:ea typeface="맑은 고딕" panose="020B0503020000020004" pitchFamily="50" charset="-127"/>
-              </a:rPr>
-              <a:t>🤔 왜</a:t>
-            </a:r>
-            <a:r>
-              <a:rPr lang="en-US" altLang="ko-KR" sz="1400" b="1">
-                <a:solidFill>
-                  <a:srgbClr val="24292F"/>
-                </a:solidFill>
-                <a:latin typeface="맑은 고딕" panose="020B0503020000020004" pitchFamily="50" charset="-127"/>
-                <a:ea typeface="맑은 고딕" panose="020B0503020000020004" pitchFamily="50" charset="-127"/>
-              </a:rPr>
-              <a:t>?</a:t>
-            </a:r>
-          </a:p>
-        </p:txBody>
-      </p:sp>
       <p:pic>
         <p:nvPicPr>
           <p:cNvPr id="4" name="그래픽 3" descr="확인 표시 단색으로 채워진">
@@ -13353,45 +12997,6 @@
         <p:spPr>
           <a:xfrm>
             <a:off x="240394" y="3856898"/>
-            <a:ext cx="433612" cy="433612"/>
-          </a:xfrm>
-          <a:prstGeom prst="rect">
-            <a:avLst/>
-          </a:prstGeom>
-        </p:spPr>
-      </p:pic>
-      <p:pic>
-        <p:nvPicPr>
-          <p:cNvPr id="13" name="그래픽 12" descr="혼란스런 얼굴(윤곽선) 단색으로 채워진">
-            <a:extLst>
-              <a:ext uri="{FF2B5EF4-FFF2-40B4-BE49-F238E27FC236}">
-                <a16:creationId xmlns:a16="http://schemas.microsoft.com/office/drawing/2014/main" id="{0C00518C-A86E-6BF3-103B-32B5CE0B732A}"/>
-              </a:ext>
-            </a:extLst>
-          </p:cNvPr>
-          <p:cNvPicPr>
-            <a:picLocks noChangeAspect="1"/>
-          </p:cNvPicPr>
-          <p:nvPr/>
-        </p:nvPicPr>
-        <p:blipFill>
-          <a:blip r:embed="rId6">
-            <a:extLst>
-              <a:ext uri="{28A0092B-C50C-407E-A947-70E740481C1C}">
-                <a14:useLocalDpi xmlns:a14="http://schemas.microsoft.com/office/drawing/2010/main" val="0"/>
-              </a:ext>
-              <a:ext uri="{96DAC541-7B7A-43D3-8B79-37D633B846F1}">
-                <asvg:svgBlip xmlns:asvg="http://schemas.microsoft.com/office/drawing/2016/SVG/main" r:embed="rId7"/>
-              </a:ext>
-            </a:extLst>
-          </a:blip>
-          <a:stretch>
-            <a:fillRect/>
-          </a:stretch>
-        </p:blipFill>
-        <p:spPr>
-          <a:xfrm>
-            <a:off x="196786" y="4310397"/>
             <a:ext cx="433612" cy="433612"/>
           </a:xfrm>
           <a:prstGeom prst="rect">
@@ -13438,52 +13043,45 @@
           </a:prstGeom>
         </p:spPr>
       </p:pic>
-      <p:cxnSp>
-        <p:nvCxnSpPr>
-          <p:cNvPr id="14" name="직선 연결선 13">
+      <p:pic>
+        <p:nvPicPr>
+          <p:cNvPr id="15" name="그래픽 14" descr="확인 표시 단색으로 채워진">
             <a:extLst>
               <a:ext uri="{FF2B5EF4-FFF2-40B4-BE49-F238E27FC236}">
-                <a16:creationId xmlns:a16="http://schemas.microsoft.com/office/drawing/2014/main" id="{580AA739-182C-272B-7392-0E049D66B594}"/>
+                <a16:creationId xmlns:a16="http://schemas.microsoft.com/office/drawing/2014/main" id="{FB736B6D-8C46-AF58-2179-183C65FD3617}"/>
               </a:ext>
             </a:extLst>
           </p:cNvPr>
-          <p:cNvCxnSpPr/>
+          <p:cNvPicPr>
+            <a:picLocks noChangeAspect="1"/>
+          </p:cNvPicPr>
           <p:nvPr/>
-        </p:nvCxnSpPr>
-        <p:spPr bwMode="auto">
+        </p:nvPicPr>
+        <p:blipFill>
+          <a:blip r:embed="rId4">
+            <a:extLst>
+              <a:ext uri="{28A0092B-C50C-407E-A947-70E740481C1C}">
+                <a14:useLocalDpi xmlns:a14="http://schemas.microsoft.com/office/drawing/2010/main" val="0"/>
+              </a:ext>
+              <a:ext uri="{96DAC541-7B7A-43D3-8B79-37D633B846F1}">
+                <asvg:svgBlip xmlns:asvg="http://schemas.microsoft.com/office/drawing/2016/SVG/main" r:embed="rId5"/>
+              </a:ext>
+            </a:extLst>
+          </a:blip>
+          <a:stretch>
+            <a:fillRect/>
+          </a:stretch>
+        </p:blipFill>
+        <p:spPr>
           <a:xfrm>
-            <a:off x="107504" y="5211873"/>
-            <a:ext cx="4680520" cy="0"/>
+            <a:off x="240394" y="4291281"/>
+            <a:ext cx="433612" cy="433612"/>
           </a:xfrm>
-          <a:prstGeom prst="line">
+          <a:prstGeom prst="rect">
             <a:avLst/>
           </a:prstGeom>
-          <a:solidFill>
-            <a:schemeClr val="accent1"/>
-          </a:solidFill>
-          <a:ln w="9525" cap="flat" cmpd="sng" algn="ctr">
-            <a:solidFill>
-              <a:schemeClr val="tx1"/>
-            </a:solidFill>
-            <a:prstDash val="solid"/>
-            <a:round/>
-            <a:headEnd type="none" w="med" len="med"/>
-            <a:tailEnd type="none" w="med" len="med"/>
-          </a:ln>
-          <a:effectLst/>
-          <a:extLst>
-            <a:ext uri="{AF507438-7753-43E0-B8FC-AC1667EBCBE1}">
-              <a14:hiddenEffects xmlns:a14="http://schemas.microsoft.com/office/drawing/2010/main">
-                <a:effectLst>
-                  <a:outerShdw dist="35921" dir="2700000" algn="ctr" rotWithShape="0">
-                    <a:schemeClr val="bg2"/>
-                  </a:outerShdw>
-                </a:effectLst>
-              </a14:hiddenEffects>
-            </a:ext>
-          </a:extLst>
         </p:spPr>
-      </p:cxnSp>
+      </p:pic>
     </p:spTree>
     <p:extLst>
       <p:ext uri="{BB962C8B-B14F-4D97-AF65-F5344CB8AC3E}">
@@ -13560,7 +13158,7 @@
                             </p:stCondLst>
                             <p:childTnLst>
                               <p:par>
-                                <p:cTn id="9" presetID="1" presetClass="entr" presetSubtype="0" fill="hold" grpId="0" nodeType="clickEffect">
+                                <p:cTn id="9" presetID="1" presetClass="entr" presetSubtype="0" fill="hold" nodeType="clickEffect">
                                   <p:stCondLst>
                                     <p:cond delay="0"/>
                                   </p:stCondLst>
@@ -13573,34 +13171,7 @@
                                           </p:stCondLst>
                                         </p:cTn>
                                         <p:tgtEl>
-                                          <p:spTgt spid="12"/>
-                                        </p:tgtEl>
-                                        <p:attrNameLst>
-                                          <p:attrName>style.visibility</p:attrName>
-                                        </p:attrNameLst>
-                                      </p:cBhvr>
-                                      <p:to>
-                                        <p:strVal val="visible"/>
-                                      </p:to>
-                                    </p:set>
-                                  </p:childTnLst>
-                                </p:cTn>
-                              </p:par>
-                              <p:par>
-                                <p:cTn id="11" presetID="1" presetClass="entr" presetSubtype="0" fill="hold" nodeType="withEffect">
-                                  <p:stCondLst>
-                                    <p:cond delay="0"/>
-                                  </p:stCondLst>
-                                  <p:childTnLst>
-                                    <p:set>
-                                      <p:cBhvr>
-                                        <p:cTn id="12" dur="1" fill="hold">
-                                          <p:stCondLst>
-                                            <p:cond delay="0"/>
-                                          </p:stCondLst>
-                                        </p:cTn>
-                                        <p:tgtEl>
-                                          <p:spTgt spid="13"/>
+                                          <p:spTgt spid="16"/>
                                         </p:tgtEl>
                                         <p:attrNameLst>
                                           <p:attrName>style.visibility</p:attrName>
@@ -13620,32 +13191,32 @@
                     </p:cTn>
                   </p:par>
                   <p:par>
-                    <p:cTn id="13" fill="hold">
+                    <p:cTn id="11" fill="hold">
                       <p:stCondLst>
                         <p:cond delay="indefinite"/>
                       </p:stCondLst>
                       <p:childTnLst>
                         <p:par>
-                          <p:cTn id="14" fill="hold">
+                          <p:cTn id="12" fill="hold">
                             <p:stCondLst>
                               <p:cond delay="0"/>
                             </p:stCondLst>
                             <p:childTnLst>
                               <p:par>
-                                <p:cTn id="15" presetID="1" presetClass="entr" presetSubtype="0" fill="hold" nodeType="clickEffect">
+                                <p:cTn id="13" presetID="1" presetClass="entr" presetSubtype="0" fill="hold" nodeType="clickEffect">
                                   <p:stCondLst>
                                     <p:cond delay="0"/>
                                   </p:stCondLst>
                                   <p:childTnLst>
                                     <p:set>
                                       <p:cBhvr>
-                                        <p:cTn id="16" dur="1" fill="hold">
+                                        <p:cTn id="14" dur="1" fill="hold">
                                           <p:stCondLst>
                                             <p:cond delay="0"/>
                                           </p:stCondLst>
                                         </p:cTn>
                                         <p:tgtEl>
-                                          <p:spTgt spid="16"/>
+                                          <p:spTgt spid="15"/>
                                         </p:tgtEl>
                                         <p:attrNameLst>
                                           <p:attrName>style.visibility</p:attrName>
@@ -13685,9 +13256,6 @@
         </p:cTn>
       </p:par>
     </p:tnLst>
-    <p:bldLst>
-      <p:bldP spid="12" grpId="0"/>
-    </p:bldLst>
   </p:timing>
 </p:sld>
 </file>

</xml_diff>